<commit_message>
alteracao de arquivos da aula04
</commit_message>
<xml_diff>
--- a/Aula 04/Portão de Garagem/Portão de Garagem.pptx
+++ b/Aula 04/Portão de Garagem/Portão de Garagem.pptx
@@ -264,7 +264,7 @@
           <a:p>
             <a:fld id="{8D066947-956F-4DCF-9678-F432016248B6}" type="datetimeFigureOut">
               <a:rPr lang="pt-BR" smtClean="0"/>
-              <a:t>25/07/2020</a:t>
+              <a:t>11/11/2022</a:t>
             </a:fld>
             <a:endParaRPr lang="pt-BR"/>
           </a:p>
@@ -462,7 +462,7 @@
           <a:p>
             <a:fld id="{8D066947-956F-4DCF-9678-F432016248B6}" type="datetimeFigureOut">
               <a:rPr lang="pt-BR" smtClean="0"/>
-              <a:t>25/07/2020</a:t>
+              <a:t>11/11/2022</a:t>
             </a:fld>
             <a:endParaRPr lang="pt-BR"/>
           </a:p>
@@ -670,7 +670,7 @@
           <a:p>
             <a:fld id="{8D066947-956F-4DCF-9678-F432016248B6}" type="datetimeFigureOut">
               <a:rPr lang="pt-BR" smtClean="0"/>
-              <a:t>25/07/2020</a:t>
+              <a:t>11/11/2022</a:t>
             </a:fld>
             <a:endParaRPr lang="pt-BR"/>
           </a:p>
@@ -868,7 +868,7 @@
           <a:p>
             <a:fld id="{8D066947-956F-4DCF-9678-F432016248B6}" type="datetimeFigureOut">
               <a:rPr lang="pt-BR" smtClean="0"/>
-              <a:t>25/07/2020</a:t>
+              <a:t>11/11/2022</a:t>
             </a:fld>
             <a:endParaRPr lang="pt-BR"/>
           </a:p>
@@ -1143,7 +1143,7 @@
           <a:p>
             <a:fld id="{8D066947-956F-4DCF-9678-F432016248B6}" type="datetimeFigureOut">
               <a:rPr lang="pt-BR" smtClean="0"/>
-              <a:t>25/07/2020</a:t>
+              <a:t>11/11/2022</a:t>
             </a:fld>
             <a:endParaRPr lang="pt-BR"/>
           </a:p>
@@ -1408,7 +1408,7 @@
           <a:p>
             <a:fld id="{8D066947-956F-4DCF-9678-F432016248B6}" type="datetimeFigureOut">
               <a:rPr lang="pt-BR" smtClean="0"/>
-              <a:t>25/07/2020</a:t>
+              <a:t>11/11/2022</a:t>
             </a:fld>
             <a:endParaRPr lang="pt-BR"/>
           </a:p>
@@ -1820,7 +1820,7 @@
           <a:p>
             <a:fld id="{8D066947-956F-4DCF-9678-F432016248B6}" type="datetimeFigureOut">
               <a:rPr lang="pt-BR" smtClean="0"/>
-              <a:t>25/07/2020</a:t>
+              <a:t>11/11/2022</a:t>
             </a:fld>
             <a:endParaRPr lang="pt-BR"/>
           </a:p>
@@ -1961,7 +1961,7 @@
           <a:p>
             <a:fld id="{8D066947-956F-4DCF-9678-F432016248B6}" type="datetimeFigureOut">
               <a:rPr lang="pt-BR" smtClean="0"/>
-              <a:t>25/07/2020</a:t>
+              <a:t>11/11/2022</a:t>
             </a:fld>
             <a:endParaRPr lang="pt-BR"/>
           </a:p>
@@ -2074,7 +2074,7 @@
           <a:p>
             <a:fld id="{8D066947-956F-4DCF-9678-F432016248B6}" type="datetimeFigureOut">
               <a:rPr lang="pt-BR" smtClean="0"/>
-              <a:t>25/07/2020</a:t>
+              <a:t>11/11/2022</a:t>
             </a:fld>
             <a:endParaRPr lang="pt-BR"/>
           </a:p>
@@ -2385,7 +2385,7 @@
           <a:p>
             <a:fld id="{8D066947-956F-4DCF-9678-F432016248B6}" type="datetimeFigureOut">
               <a:rPr lang="pt-BR" smtClean="0"/>
-              <a:t>25/07/2020</a:t>
+              <a:t>11/11/2022</a:t>
             </a:fld>
             <a:endParaRPr lang="pt-BR"/>
           </a:p>
@@ -2673,7 +2673,7 @@
           <a:p>
             <a:fld id="{8D066947-956F-4DCF-9678-F432016248B6}" type="datetimeFigureOut">
               <a:rPr lang="pt-BR" smtClean="0"/>
-              <a:t>25/07/2020</a:t>
+              <a:t>11/11/2022</a:t>
             </a:fld>
             <a:endParaRPr lang="pt-BR"/>
           </a:p>
@@ -2914,7 +2914,7 @@
           <a:p>
             <a:fld id="{8D066947-956F-4DCF-9678-F432016248B6}" type="datetimeFigureOut">
               <a:rPr lang="pt-BR" smtClean="0"/>
-              <a:t>25/07/2020</a:t>
+              <a:t>11/11/2022</a:t>
             </a:fld>
             <a:endParaRPr lang="pt-BR"/>
           </a:p>
@@ -3555,12 +3555,47 @@
           <a:chExt cx="0" cy="0"/>
         </a:xfrm>
       </p:grpSpPr>
+      <p:sp>
+        <p:nvSpPr>
+          <p:cNvPr id="4" name="CaixaDeTexto 3">
+            <a:extLst>
+              <a:ext uri="{FF2B5EF4-FFF2-40B4-BE49-F238E27FC236}">
+                <a16:creationId xmlns:a16="http://schemas.microsoft.com/office/drawing/2014/main" id="{E369880D-0420-4D5A-8DB5-E5D9885EDCAF}"/>
+              </a:ext>
+            </a:extLst>
+          </p:cNvPr>
+          <p:cNvSpPr txBox="1"/>
+          <p:nvPr/>
+        </p:nvSpPr>
+        <p:spPr>
+          <a:xfrm>
+            <a:off x="4707256" y="380855"/>
+            <a:ext cx="1147750" cy="369332"/>
+          </a:xfrm>
+          <a:prstGeom prst="rect">
+            <a:avLst/>
+          </a:prstGeom>
+          <a:noFill/>
+        </p:spPr>
+        <p:txBody>
+          <a:bodyPr wrap="none" rtlCol="0">
+            <a:spAutoFit/>
+          </a:bodyPr>
+          <a:lstStyle/>
+          <a:p>
+            <a:r>
+              <a:rPr lang="pt-BR" dirty="0"/>
+              <a:t>Solução 1:</a:t>
+            </a:r>
+          </a:p>
+        </p:txBody>
+      </p:sp>
       <p:pic>
         <p:nvPicPr>
-          <p:cNvPr id="3" name="Imagem 2">
-            <a:extLst>
-              <a:ext uri="{FF2B5EF4-FFF2-40B4-BE49-F238E27FC236}">
-                <a16:creationId xmlns:a16="http://schemas.microsoft.com/office/drawing/2014/main" id="{91778C2E-7664-4463-80D4-ACEB96F5117E}"/>
+          <p:cNvPr id="5" name="Imagem 4">
+            <a:extLst>
+              <a:ext uri="{FF2B5EF4-FFF2-40B4-BE49-F238E27FC236}">
+                <a16:creationId xmlns:a16="http://schemas.microsoft.com/office/drawing/2014/main" id="{3FCDC171-8622-CA22-14DA-01996DA66860}"/>
               </a:ext>
             </a:extLst>
           </p:cNvPr>
@@ -3577,49 +3612,14 @@
         </p:blipFill>
         <p:spPr>
           <a:xfrm>
-            <a:off x="3090862" y="914400"/>
-            <a:ext cx="6010275" cy="5029200"/>
+            <a:off x="2123594" y="987054"/>
+            <a:ext cx="6315075" cy="5305425"/>
           </a:xfrm>
           <a:prstGeom prst="rect">
             <a:avLst/>
           </a:prstGeom>
         </p:spPr>
       </p:pic>
-      <p:sp>
-        <p:nvSpPr>
-          <p:cNvPr id="4" name="CaixaDeTexto 3">
-            <a:extLst>
-              <a:ext uri="{FF2B5EF4-FFF2-40B4-BE49-F238E27FC236}">
-                <a16:creationId xmlns:a16="http://schemas.microsoft.com/office/drawing/2014/main" id="{E369880D-0420-4D5A-8DB5-E5D9885EDCAF}"/>
-              </a:ext>
-            </a:extLst>
-          </p:cNvPr>
-          <p:cNvSpPr txBox="1"/>
-          <p:nvPr/>
-        </p:nvSpPr>
-        <p:spPr>
-          <a:xfrm>
-            <a:off x="3648722" y="479394"/>
-            <a:ext cx="1147750" cy="369332"/>
-          </a:xfrm>
-          <a:prstGeom prst="rect">
-            <a:avLst/>
-          </a:prstGeom>
-          <a:noFill/>
-        </p:spPr>
-        <p:txBody>
-          <a:bodyPr wrap="none" rtlCol="0">
-            <a:spAutoFit/>
-          </a:bodyPr>
-          <a:lstStyle/>
-          <a:p>
-            <a:r>
-              <a:rPr lang="pt-BR" dirty="0"/>
-              <a:t>Solução 1:</a:t>
-            </a:r>
-          </a:p>
-        </p:txBody>
-      </p:sp>
     </p:spTree>
     <p:extLst>
       <p:ext uri="{BB962C8B-B14F-4D97-AF65-F5344CB8AC3E}">
@@ -5042,13 +5042,13 @@
 </file>
 
 <file path=customXml/itemProps1.xml><?xml version="1.0" encoding="utf-8"?>
-<ds:datastoreItem xmlns:ds="http://schemas.openxmlformats.org/officeDocument/2006/customXml" ds:itemID="{383FC239-2CEE-4A7B-B05C-A9841DA5A151}"/>
+<ds:datastoreItem xmlns:ds="http://schemas.openxmlformats.org/officeDocument/2006/customXml" ds:itemID="{43AFF6AC-7C55-4861-A971-553DB26D44AA}"/>
 </file>
 
 <file path=customXml/itemProps2.xml><?xml version="1.0" encoding="utf-8"?>
-<ds:datastoreItem xmlns:ds="http://schemas.openxmlformats.org/officeDocument/2006/customXml" ds:itemID="{1ED60772-B277-42C5-BAEA-BDAFDBB983C9}"/>
+<ds:datastoreItem xmlns:ds="http://schemas.openxmlformats.org/officeDocument/2006/customXml" ds:itemID="{4BC199BA-4600-483C-A0A7-AFFBC3F88689}"/>
 </file>
 
 <file path=customXml/itemProps3.xml><?xml version="1.0" encoding="utf-8"?>
-<ds:datastoreItem xmlns:ds="http://schemas.openxmlformats.org/officeDocument/2006/customXml" ds:itemID="{E2C074B3-4D8B-4EF4-8EBA-0916210C9886}"/>
+<ds:datastoreItem xmlns:ds="http://schemas.openxmlformats.org/officeDocument/2006/customXml" ds:itemID="{0BD2E3CB-3845-4421-9C2F-2FB23D55447F}"/>
 </file>
</xml_diff>